<commit_message>
edits from George and Charles, 11/1/2017
</commit_message>
<xml_diff>
--- a/figure/preprocessing/Figure12.pptx
+++ b/figure/preprocessing/Figure12.pptx
@@ -192,7 +192,7 @@
           <a:p>
             <a:fld id="{86C8C9D3-7DBA-5A45-9986-071634E7074B}" type="datetimeFigureOut">
               <a:rPr lang="en-US" smtClean="0"/>
-              <a:t>10/12/17</a:t>
+              <a:t>11/1/17</a:t>
             </a:fld>
             <a:endParaRPr lang="en-US"/>
           </a:p>
@@ -675,7 +675,7 @@
           <a:p>
             <a:fld id="{571AC92B-1F9B-B741-93E4-1ECF27636BBF}" type="datetimeFigureOut">
               <a:rPr lang="en-US" smtClean="0"/>
-              <a:t>10/12/17</a:t>
+              <a:t>11/1/17</a:t>
             </a:fld>
             <a:endParaRPr lang="en-US"/>
           </a:p>
@@ -840,7 +840,7 @@
           <a:p>
             <a:fld id="{571AC92B-1F9B-B741-93E4-1ECF27636BBF}" type="datetimeFigureOut">
               <a:rPr lang="en-US" smtClean="0"/>
-              <a:t>10/12/17</a:t>
+              <a:t>11/1/17</a:t>
             </a:fld>
             <a:endParaRPr lang="en-US"/>
           </a:p>
@@ -1015,7 +1015,7 @@
           <a:p>
             <a:fld id="{571AC92B-1F9B-B741-93E4-1ECF27636BBF}" type="datetimeFigureOut">
               <a:rPr lang="en-US" smtClean="0"/>
-              <a:t>10/12/17</a:t>
+              <a:t>11/1/17</a:t>
             </a:fld>
             <a:endParaRPr lang="en-US"/>
           </a:p>
@@ -1180,7 +1180,7 @@
           <a:p>
             <a:fld id="{571AC92B-1F9B-B741-93E4-1ECF27636BBF}" type="datetimeFigureOut">
               <a:rPr lang="en-US" smtClean="0"/>
-              <a:t>10/12/17</a:t>
+              <a:t>11/1/17</a:t>
             </a:fld>
             <a:endParaRPr lang="en-US"/>
           </a:p>
@@ -1419,7 +1419,7 @@
           <a:p>
             <a:fld id="{571AC92B-1F9B-B741-93E4-1ECF27636BBF}" type="datetimeFigureOut">
               <a:rPr lang="en-US" smtClean="0"/>
-              <a:t>10/12/17</a:t>
+              <a:t>11/1/17</a:t>
             </a:fld>
             <a:endParaRPr lang="en-US"/>
           </a:p>
@@ -1646,7 +1646,7 @@
           <a:p>
             <a:fld id="{571AC92B-1F9B-B741-93E4-1ECF27636BBF}" type="datetimeFigureOut">
               <a:rPr lang="en-US" smtClean="0"/>
-              <a:t>10/12/17</a:t>
+              <a:t>11/1/17</a:t>
             </a:fld>
             <a:endParaRPr lang="en-US"/>
           </a:p>
@@ -2008,7 +2008,7 @@
           <a:p>
             <a:fld id="{571AC92B-1F9B-B741-93E4-1ECF27636BBF}" type="datetimeFigureOut">
               <a:rPr lang="en-US" smtClean="0"/>
-              <a:t>10/12/17</a:t>
+              <a:t>11/1/17</a:t>
             </a:fld>
             <a:endParaRPr lang="en-US"/>
           </a:p>
@@ -2121,7 +2121,7 @@
           <a:p>
             <a:fld id="{571AC92B-1F9B-B741-93E4-1ECF27636BBF}" type="datetimeFigureOut">
               <a:rPr lang="en-US" smtClean="0"/>
-              <a:t>10/12/17</a:t>
+              <a:t>11/1/17</a:t>
             </a:fld>
             <a:endParaRPr lang="en-US"/>
           </a:p>
@@ -2211,7 +2211,7 @@
           <a:p>
             <a:fld id="{571AC92B-1F9B-B741-93E4-1ECF27636BBF}" type="datetimeFigureOut">
               <a:rPr lang="en-US" smtClean="0"/>
-              <a:t>10/12/17</a:t>
+              <a:t>11/1/17</a:t>
             </a:fld>
             <a:endParaRPr lang="en-US"/>
           </a:p>
@@ -2483,7 +2483,7 @@
           <a:p>
             <a:fld id="{571AC92B-1F9B-B741-93E4-1ECF27636BBF}" type="datetimeFigureOut">
               <a:rPr lang="en-US" smtClean="0"/>
-              <a:t>10/12/17</a:t>
+              <a:t>11/1/17</a:t>
             </a:fld>
             <a:endParaRPr lang="en-US"/>
           </a:p>
@@ -2735,7 +2735,7 @@
           <a:p>
             <a:fld id="{571AC92B-1F9B-B741-93E4-1ECF27636BBF}" type="datetimeFigureOut">
               <a:rPr lang="en-US" smtClean="0"/>
-              <a:t>10/12/17</a:t>
+              <a:t>11/1/17</a:t>
             </a:fld>
             <a:endParaRPr lang="en-US"/>
           </a:p>
@@ -2943,7 +2943,7 @@
           <a:p>
             <a:fld id="{571AC92B-1F9B-B741-93E4-1ECF27636BBF}" type="datetimeFigureOut">
               <a:rPr lang="en-US" smtClean="0"/>
-              <a:t>10/12/17</a:t>
+              <a:t>11/1/17</a:t>
             </a:fld>
             <a:endParaRPr lang="en-US"/>
           </a:p>
@@ -3350,7 +3350,7 @@
       </p:grpSpPr>
       <p:pic>
         <p:nvPicPr>
-          <p:cNvPr id="3" name="Picture 2" descr="GUIsetting1.png"/>
+          <p:cNvPr id="3" name="Picture 2"/>
           <p:cNvPicPr>
             <a:picLocks noChangeAspect="1"/>
           </p:cNvPicPr>
@@ -3370,8 +3370,8 @@
         </p:blipFill>
         <p:spPr>
           <a:xfrm>
-            <a:off x="0" y="0"/>
-            <a:ext cx="6218238" cy="3431498"/>
+            <a:off x="-4995" y="51916"/>
+            <a:ext cx="6223233" cy="3230582"/>
           </a:xfrm>
           <a:prstGeom prst="rect">
             <a:avLst/>
@@ -3400,7 +3400,7 @@
         </p:blipFill>
         <p:spPr>
           <a:xfrm>
-            <a:off x="0" y="3155499"/>
+            <a:off x="0" y="3282498"/>
             <a:ext cx="4311081" cy="2100270"/>
           </a:xfrm>
           <a:prstGeom prst="rect">
@@ -3416,7 +3416,89 @@
         </p:nvSpPr>
         <p:spPr>
           <a:xfrm>
-            <a:off x="509727" y="285116"/>
+            <a:off x="3809" y="246014"/>
+            <a:ext cx="2141262" cy="191430"/>
+          </a:xfrm>
+          <a:prstGeom prst="roundRect">
+            <a:avLst/>
+          </a:prstGeom>
+          <a:noFill/>
+          <a:ln>
+            <a:solidFill>
+              <a:srgbClr val="FF0000"/>
+            </a:solidFill>
+          </a:ln>
+        </p:spPr>
+        <p:style>
+          <a:lnRef idx="1">
+            <a:schemeClr val="accent1"/>
+          </a:lnRef>
+          <a:fillRef idx="3">
+            <a:schemeClr val="accent1"/>
+          </a:fillRef>
+          <a:effectRef idx="2">
+            <a:schemeClr val="accent1"/>
+          </a:effectRef>
+          <a:fontRef idx="minor">
+            <a:schemeClr val="lt1"/>
+          </a:fontRef>
+        </p:style>
+        <p:txBody>
+          <a:bodyPr rtlCol="0" anchor="ctr"/>
+          <a:lstStyle/>
+          <a:p>
+            <a:pPr algn="ctr"/>
+            <a:endParaRPr lang="en-US"/>
+          </a:p>
+        </p:txBody>
+      </p:sp>
+      <p:sp>
+        <p:nvSpPr>
+          <p:cNvPr id="21" name="TextBox 20"/>
+          <p:cNvSpPr txBox="1"/>
+          <p:nvPr/>
+        </p:nvSpPr>
+        <p:spPr>
+          <a:xfrm>
+            <a:off x="0" y="-29781"/>
+            <a:ext cx="501088" cy="276999"/>
+          </a:xfrm>
+          <a:prstGeom prst="rect">
+            <a:avLst/>
+          </a:prstGeom>
+          <a:noFill/>
+        </p:spPr>
+        <p:txBody>
+          <a:bodyPr wrap="square" rtlCol="0">
+            <a:spAutoFit/>
+          </a:bodyPr>
+          <a:lstStyle/>
+          <a:p>
+            <a:r>
+              <a:rPr lang="en-US" sz="1200" dirty="0" smtClean="0">
+                <a:solidFill>
+                  <a:srgbClr val="FF0000"/>
+                </a:solidFill>
+              </a:rPr>
+              <a:t>(1)</a:t>
+            </a:r>
+            <a:endParaRPr lang="en-US" sz="1200" dirty="0">
+              <a:solidFill>
+                <a:srgbClr val="FF0000"/>
+              </a:solidFill>
+            </a:endParaRPr>
+          </a:p>
+        </p:txBody>
+      </p:sp>
+      <p:sp>
+        <p:nvSpPr>
+          <p:cNvPr id="23" name="Rounded Rectangle 22"/>
+          <p:cNvSpPr/>
+          <p:nvPr/>
+        </p:nvSpPr>
+        <p:spPr>
+          <a:xfrm>
+            <a:off x="91924" y="2583946"/>
             <a:ext cx="2306731" cy="302396"/>
           </a:xfrm>
           <a:prstGeom prst="roundRect">
@@ -3454,13 +3536,13 @@
       </p:sp>
       <p:sp>
         <p:nvSpPr>
-          <p:cNvPr id="21" name="TextBox 20"/>
+          <p:cNvPr id="24" name="TextBox 23"/>
           <p:cNvSpPr txBox="1"/>
           <p:nvPr/>
         </p:nvSpPr>
         <p:spPr>
           <a:xfrm>
-            <a:off x="371486" y="43195"/>
+            <a:off x="-63595" y="2319274"/>
             <a:ext cx="501088" cy="276999"/>
           </a:xfrm>
           <a:prstGeom prst="rect">
@@ -3480,7 +3562,7 @@
                   <a:srgbClr val="FF0000"/>
                 </a:solidFill>
               </a:rPr>
-              <a:t>(1)</a:t>
+              <a:t>(2)</a:t>
             </a:r>
             <a:endParaRPr lang="en-US" sz="1200" dirty="0">
               <a:solidFill>
@@ -3492,13 +3574,177 @@
       </p:sp>
       <p:sp>
         <p:nvSpPr>
-          <p:cNvPr id="23" name="Rounded Rectangle 22"/>
+          <p:cNvPr id="25" name="Rounded Rectangle 24"/>
           <p:cNvSpPr/>
           <p:nvPr/>
         </p:nvSpPr>
         <p:spPr>
           <a:xfrm>
-            <a:off x="91924" y="2485169"/>
+            <a:off x="4623543" y="268332"/>
+            <a:ext cx="840903" cy="231119"/>
+          </a:xfrm>
+          <a:prstGeom prst="roundRect">
+            <a:avLst/>
+          </a:prstGeom>
+          <a:noFill/>
+          <a:ln>
+            <a:solidFill>
+              <a:srgbClr val="FF0000"/>
+            </a:solidFill>
+          </a:ln>
+        </p:spPr>
+        <p:style>
+          <a:lnRef idx="1">
+            <a:schemeClr val="accent1"/>
+          </a:lnRef>
+          <a:fillRef idx="3">
+            <a:schemeClr val="accent1"/>
+          </a:fillRef>
+          <a:effectRef idx="2">
+            <a:schemeClr val="accent1"/>
+          </a:effectRef>
+          <a:fontRef idx="minor">
+            <a:schemeClr val="lt1"/>
+          </a:fontRef>
+        </p:style>
+        <p:txBody>
+          <a:bodyPr rtlCol="0" anchor="ctr"/>
+          <a:lstStyle/>
+          <a:p>
+            <a:pPr algn="ctr"/>
+            <a:endParaRPr lang="en-US"/>
+          </a:p>
+        </p:txBody>
+      </p:sp>
+      <p:sp>
+        <p:nvSpPr>
+          <p:cNvPr id="26" name="TextBox 25"/>
+          <p:cNvSpPr txBox="1"/>
+          <p:nvPr/>
+        </p:nvSpPr>
+        <p:spPr>
+          <a:xfrm>
+            <a:off x="4397471" y="-3308"/>
+            <a:ext cx="501088" cy="276999"/>
+          </a:xfrm>
+          <a:prstGeom prst="rect">
+            <a:avLst/>
+          </a:prstGeom>
+          <a:noFill/>
+        </p:spPr>
+        <p:txBody>
+          <a:bodyPr wrap="square" rtlCol="0">
+            <a:spAutoFit/>
+          </a:bodyPr>
+          <a:lstStyle/>
+          <a:p>
+            <a:r>
+              <a:rPr lang="en-US" sz="1200" dirty="0" smtClean="0">
+                <a:solidFill>
+                  <a:srgbClr val="FF0000"/>
+                </a:solidFill>
+              </a:rPr>
+              <a:t>(3)</a:t>
+            </a:r>
+            <a:endParaRPr lang="en-US" sz="1200" dirty="0">
+              <a:solidFill>
+                <a:srgbClr val="FF0000"/>
+              </a:solidFill>
+            </a:endParaRPr>
+          </a:p>
+        </p:txBody>
+      </p:sp>
+      <p:sp>
+        <p:nvSpPr>
+          <p:cNvPr id="27" name="Rounded Rectangle 26"/>
+          <p:cNvSpPr/>
+          <p:nvPr/>
+        </p:nvSpPr>
+        <p:spPr>
+          <a:xfrm>
+            <a:off x="5499159" y="246014"/>
+            <a:ext cx="746101" cy="253437"/>
+          </a:xfrm>
+          <a:prstGeom prst="roundRect">
+            <a:avLst/>
+          </a:prstGeom>
+          <a:noFill/>
+          <a:ln>
+            <a:solidFill>
+              <a:srgbClr val="FF0000"/>
+            </a:solidFill>
+          </a:ln>
+        </p:spPr>
+        <p:style>
+          <a:lnRef idx="1">
+            <a:schemeClr val="accent1"/>
+          </a:lnRef>
+          <a:fillRef idx="3">
+            <a:schemeClr val="accent1"/>
+          </a:fillRef>
+          <a:effectRef idx="2">
+            <a:schemeClr val="accent1"/>
+          </a:effectRef>
+          <a:fontRef idx="minor">
+            <a:schemeClr val="lt1"/>
+          </a:fontRef>
+        </p:style>
+        <p:txBody>
+          <a:bodyPr rtlCol="0" anchor="ctr"/>
+          <a:lstStyle/>
+          <a:p>
+            <a:pPr algn="ctr"/>
+            <a:endParaRPr lang="en-US"/>
+          </a:p>
+        </p:txBody>
+      </p:sp>
+      <p:sp>
+        <p:nvSpPr>
+          <p:cNvPr id="28" name="TextBox 27"/>
+          <p:cNvSpPr txBox="1"/>
+          <p:nvPr/>
+        </p:nvSpPr>
+        <p:spPr>
+          <a:xfrm>
+            <a:off x="5325261" y="-3308"/>
+            <a:ext cx="501088" cy="276999"/>
+          </a:xfrm>
+          <a:prstGeom prst="rect">
+            <a:avLst/>
+          </a:prstGeom>
+          <a:noFill/>
+        </p:spPr>
+        <p:txBody>
+          <a:bodyPr wrap="square" rtlCol="0">
+            <a:spAutoFit/>
+          </a:bodyPr>
+          <a:lstStyle/>
+          <a:p>
+            <a:r>
+              <a:rPr lang="en-US" sz="1200" dirty="0" smtClean="0">
+                <a:solidFill>
+                  <a:srgbClr val="FF0000"/>
+                </a:solidFill>
+              </a:rPr>
+              <a:t>(5)</a:t>
+            </a:r>
+            <a:endParaRPr lang="en-US" sz="1200" dirty="0">
+              <a:solidFill>
+                <a:srgbClr val="FF0000"/>
+              </a:solidFill>
+            </a:endParaRPr>
+          </a:p>
+        </p:txBody>
+      </p:sp>
+      <p:sp>
+        <p:nvSpPr>
+          <p:cNvPr id="29" name="Rounded Rectangle 28"/>
+          <p:cNvSpPr/>
+          <p:nvPr/>
+        </p:nvSpPr>
+        <p:spPr>
+          <a:xfrm>
+            <a:off x="91924" y="3702260"/>
             <a:ext cx="2306731" cy="302396"/>
           </a:xfrm>
           <a:prstGeom prst="roundRect">
@@ -3536,259 +3782,13 @@
       </p:sp>
       <p:sp>
         <p:nvSpPr>
-          <p:cNvPr id="24" name="TextBox 23"/>
-          <p:cNvSpPr txBox="1"/>
-          <p:nvPr/>
-        </p:nvSpPr>
-        <p:spPr>
-          <a:xfrm>
-            <a:off x="-63595" y="2234608"/>
-            <a:ext cx="501088" cy="276999"/>
-          </a:xfrm>
-          <a:prstGeom prst="rect">
-            <a:avLst/>
-          </a:prstGeom>
-          <a:noFill/>
-        </p:spPr>
-        <p:txBody>
-          <a:bodyPr wrap="square" rtlCol="0">
-            <a:spAutoFit/>
-          </a:bodyPr>
-          <a:lstStyle/>
-          <a:p>
-            <a:r>
-              <a:rPr lang="en-US" sz="1200" dirty="0" smtClean="0">
-                <a:solidFill>
-                  <a:srgbClr val="FF0000"/>
-                </a:solidFill>
-              </a:rPr>
-              <a:t>(2)</a:t>
-            </a:r>
-            <a:endParaRPr lang="en-US" sz="1200" dirty="0">
-              <a:solidFill>
-                <a:srgbClr val="FF0000"/>
-              </a:solidFill>
-            </a:endParaRPr>
-          </a:p>
-        </p:txBody>
-      </p:sp>
-      <p:sp>
-        <p:nvSpPr>
-          <p:cNvPr id="25" name="Rounded Rectangle 24"/>
-          <p:cNvSpPr/>
-          <p:nvPr/>
-        </p:nvSpPr>
-        <p:spPr>
-          <a:xfrm>
-            <a:off x="4561625" y="275468"/>
-            <a:ext cx="902821" cy="302396"/>
-          </a:xfrm>
-          <a:prstGeom prst="roundRect">
-            <a:avLst/>
-          </a:prstGeom>
-          <a:noFill/>
-          <a:ln>
-            <a:solidFill>
-              <a:srgbClr val="FF0000"/>
-            </a:solidFill>
-          </a:ln>
-        </p:spPr>
-        <p:style>
-          <a:lnRef idx="1">
-            <a:schemeClr val="accent1"/>
-          </a:lnRef>
-          <a:fillRef idx="3">
-            <a:schemeClr val="accent1"/>
-          </a:fillRef>
-          <a:effectRef idx="2">
-            <a:schemeClr val="accent1"/>
-          </a:effectRef>
-          <a:fontRef idx="minor">
-            <a:schemeClr val="lt1"/>
-          </a:fontRef>
-        </p:style>
-        <p:txBody>
-          <a:bodyPr rtlCol="0" anchor="ctr"/>
-          <a:lstStyle/>
-          <a:p>
-            <a:pPr algn="ctr"/>
-            <a:endParaRPr lang="en-US"/>
-          </a:p>
-        </p:txBody>
-      </p:sp>
-      <p:sp>
-        <p:nvSpPr>
-          <p:cNvPr id="26" name="TextBox 25"/>
-          <p:cNvSpPr txBox="1"/>
-          <p:nvPr/>
-        </p:nvSpPr>
-        <p:spPr>
-          <a:xfrm>
-            <a:off x="4397471" y="37219"/>
-            <a:ext cx="501088" cy="276999"/>
-          </a:xfrm>
-          <a:prstGeom prst="rect">
-            <a:avLst/>
-          </a:prstGeom>
-          <a:noFill/>
-        </p:spPr>
-        <p:txBody>
-          <a:bodyPr wrap="square" rtlCol="0">
-            <a:spAutoFit/>
-          </a:bodyPr>
-          <a:lstStyle/>
-          <a:p>
-            <a:r>
-              <a:rPr lang="en-US" sz="1200" dirty="0" smtClean="0">
-                <a:solidFill>
-                  <a:srgbClr val="FF0000"/>
-                </a:solidFill>
-              </a:rPr>
-              <a:t>(3)</a:t>
-            </a:r>
-            <a:endParaRPr lang="en-US" sz="1200" dirty="0">
-              <a:solidFill>
-                <a:srgbClr val="FF0000"/>
-              </a:solidFill>
-            </a:endParaRPr>
-          </a:p>
-        </p:txBody>
-      </p:sp>
-      <p:sp>
-        <p:nvSpPr>
-          <p:cNvPr id="27" name="Rounded Rectangle 26"/>
-          <p:cNvSpPr/>
-          <p:nvPr/>
-        </p:nvSpPr>
-        <p:spPr>
-          <a:xfrm>
-            <a:off x="5472137" y="280990"/>
-            <a:ext cx="746101" cy="302396"/>
-          </a:xfrm>
-          <a:prstGeom prst="roundRect">
-            <a:avLst/>
-          </a:prstGeom>
-          <a:noFill/>
-          <a:ln>
-            <a:solidFill>
-              <a:srgbClr val="FF0000"/>
-            </a:solidFill>
-          </a:ln>
-        </p:spPr>
-        <p:style>
-          <a:lnRef idx="1">
-            <a:schemeClr val="accent1"/>
-          </a:lnRef>
-          <a:fillRef idx="3">
-            <a:schemeClr val="accent1"/>
-          </a:fillRef>
-          <a:effectRef idx="2">
-            <a:schemeClr val="accent1"/>
-          </a:effectRef>
-          <a:fontRef idx="minor">
-            <a:schemeClr val="lt1"/>
-          </a:fontRef>
-        </p:style>
-        <p:txBody>
-          <a:bodyPr rtlCol="0" anchor="ctr"/>
-          <a:lstStyle/>
-          <a:p>
-            <a:pPr algn="ctr"/>
-            <a:endParaRPr lang="en-US"/>
-          </a:p>
-        </p:txBody>
-      </p:sp>
-      <p:sp>
-        <p:nvSpPr>
-          <p:cNvPr id="28" name="TextBox 27"/>
-          <p:cNvSpPr txBox="1"/>
-          <p:nvPr/>
-        </p:nvSpPr>
-        <p:spPr>
-          <a:xfrm>
-            <a:off x="5325261" y="37219"/>
-            <a:ext cx="501088" cy="276999"/>
-          </a:xfrm>
-          <a:prstGeom prst="rect">
-            <a:avLst/>
-          </a:prstGeom>
-          <a:noFill/>
-        </p:spPr>
-        <p:txBody>
-          <a:bodyPr wrap="square" rtlCol="0">
-            <a:spAutoFit/>
-          </a:bodyPr>
-          <a:lstStyle/>
-          <a:p>
-            <a:r>
-              <a:rPr lang="en-US" sz="1200" dirty="0" smtClean="0">
-                <a:solidFill>
-                  <a:srgbClr val="FF0000"/>
-                </a:solidFill>
-              </a:rPr>
-              <a:t>(5)</a:t>
-            </a:r>
-            <a:endParaRPr lang="en-US" sz="1200" dirty="0">
-              <a:solidFill>
-                <a:srgbClr val="FF0000"/>
-              </a:solidFill>
-            </a:endParaRPr>
-          </a:p>
-        </p:txBody>
-      </p:sp>
-      <p:sp>
-        <p:nvSpPr>
-          <p:cNvPr id="29" name="Rounded Rectangle 28"/>
-          <p:cNvSpPr/>
-          <p:nvPr/>
-        </p:nvSpPr>
-        <p:spPr>
-          <a:xfrm>
-            <a:off x="91924" y="3575261"/>
-            <a:ext cx="2306731" cy="302396"/>
-          </a:xfrm>
-          <a:prstGeom prst="roundRect">
-            <a:avLst/>
-          </a:prstGeom>
-          <a:noFill/>
-          <a:ln>
-            <a:solidFill>
-              <a:srgbClr val="FF0000"/>
-            </a:solidFill>
-          </a:ln>
-        </p:spPr>
-        <p:style>
-          <a:lnRef idx="1">
-            <a:schemeClr val="accent1"/>
-          </a:lnRef>
-          <a:fillRef idx="3">
-            <a:schemeClr val="accent1"/>
-          </a:fillRef>
-          <a:effectRef idx="2">
-            <a:schemeClr val="accent1"/>
-          </a:effectRef>
-          <a:fontRef idx="minor">
-            <a:schemeClr val="lt1"/>
-          </a:fontRef>
-        </p:style>
-        <p:txBody>
-          <a:bodyPr rtlCol="0" anchor="ctr"/>
-          <a:lstStyle/>
-          <a:p>
-            <a:pPr algn="ctr"/>
-            <a:endParaRPr lang="en-US"/>
-          </a:p>
-        </p:txBody>
-      </p:sp>
-      <p:sp>
-        <p:nvSpPr>
           <p:cNvPr id="30" name="TextBox 29"/>
           <p:cNvSpPr txBox="1"/>
           <p:nvPr/>
         </p:nvSpPr>
         <p:spPr>
           <a:xfrm>
-            <a:off x="-72234" y="3333340"/>
+            <a:off x="-72234" y="3460339"/>
             <a:ext cx="501088" cy="276999"/>
           </a:xfrm>
           <a:prstGeom prst="rect">
@@ -4093,7 +4093,7 @@
   <a:extraClrSchemeLst/>
   <a:extLst>
     <a:ext uri="{05A4C25C-085E-4340-85A3-A5531E510DB2}">
-      <thm15:themeFamily xmlns="" xmlns:thm15="http://schemas.microsoft.com/office/thememl/2012/main" name="Office Theme" id="{62F939B6-93AF-4DB8-9C6B-D6C7DFDC589F}" vid="{4A3C46E8-61CC-4603-A589-7422A47A8E4A}"/>
+      <thm15:themeFamily xmlns:thm15="http://schemas.microsoft.com/office/thememl/2012/main" xmlns="" name="Office Theme" id="{62F939B6-93AF-4DB8-9C6B-D6C7DFDC589F}" vid="{4A3C46E8-61CC-4603-A589-7422A47A8E4A}"/>
     </a:ext>
   </a:extLst>
 </a:theme>
@@ -4354,7 +4354,7 @@
   <a:extraClrSchemeLst/>
   <a:extLst>
     <a:ext uri="{05A4C25C-085E-4340-85A3-A5531E510DB2}">
-      <thm15:themeFamily xmlns="" xmlns:thm15="http://schemas.microsoft.com/office/thememl/2012/main" name="Office Theme" id="{62F939B6-93AF-4DB8-9C6B-D6C7DFDC589F}" vid="{4A3C46E8-61CC-4603-A589-7422A47A8E4A}"/>
+      <thm15:themeFamily xmlns:thm15="http://schemas.microsoft.com/office/thememl/2012/main" xmlns="" name="Office Theme" id="{62F939B6-93AF-4DB8-9C6B-D6C7DFDC589F}" vid="{4A3C46E8-61CC-4603-A589-7422A47A8E4A}"/>
     </a:ext>
   </a:extLst>
 </a:theme>

</xml_diff>

<commit_message>
update tutorial, now to preprocessing
</commit_message>
<xml_diff>
--- a/figure/preprocessing/Figure12.pptx
+++ b/figure/preprocessing/Figure12.pptx
@@ -5,10 +5,11 @@
     <p:sldMasterId id="2147483780" r:id="rId1"/>
   </p:sldMasterIdLst>
   <p:notesMasterIdLst>
-    <p:notesMasterId r:id="rId3"/>
+    <p:notesMasterId r:id="rId4"/>
   </p:notesMasterIdLst>
   <p:sldIdLst>
     <p:sldId id="257" r:id="rId2"/>
+    <p:sldId id="259" r:id="rId3"/>
   </p:sldIdLst>
   <p:sldSz cx="6218238" cy="6492875"/>
   <p:notesSz cx="6858000" cy="9144000"/>
@@ -107,6 +108,22 @@
       </a:defRPr>
     </a:lvl9pPr>
   </p:defaultTextStyle>
+  <p:extLst>
+    <p:ext uri="{EFAFB233-063F-42B5-8137-9DF3F51BA10A}">
+      <p15:sldGuideLst xmlns:p15="http://schemas.microsoft.com/office/powerpoint/2012/main">
+        <p15:guide id="1" orient="horz" pos="2045">
+          <p15:clr>
+            <a:srgbClr val="A4A3A4"/>
+          </p15:clr>
+        </p15:guide>
+        <p15:guide id="2" pos="1958">
+          <p15:clr>
+            <a:srgbClr val="A4A3A4"/>
+          </p15:clr>
+        </p15:guide>
+      </p15:sldGuideLst>
+    </p:ext>
+  </p:extLst>
 </p:presentation>
 </file>
 
@@ -192,7 +209,7 @@
           <a:p>
             <a:fld id="{86C8C9D3-7DBA-5A45-9986-071634E7074B}" type="datetimeFigureOut">
               <a:rPr lang="en-US" smtClean="0"/>
-              <a:t>11/1/17</a:t>
+              <a:t>4/14/18</a:t>
             </a:fld>
             <a:endParaRPr lang="en-US"/>
           </a:p>
@@ -675,7 +692,7 @@
           <a:p>
             <a:fld id="{571AC92B-1F9B-B741-93E4-1ECF27636BBF}" type="datetimeFigureOut">
               <a:rPr lang="en-US" smtClean="0"/>
-              <a:t>11/1/17</a:t>
+              <a:t>4/14/18</a:t>
             </a:fld>
             <a:endParaRPr lang="en-US"/>
           </a:p>
@@ -840,7 +857,7 @@
           <a:p>
             <a:fld id="{571AC92B-1F9B-B741-93E4-1ECF27636BBF}" type="datetimeFigureOut">
               <a:rPr lang="en-US" smtClean="0"/>
-              <a:t>11/1/17</a:t>
+              <a:t>4/14/18</a:t>
             </a:fld>
             <a:endParaRPr lang="en-US"/>
           </a:p>
@@ -1015,7 +1032,7 @@
           <a:p>
             <a:fld id="{571AC92B-1F9B-B741-93E4-1ECF27636BBF}" type="datetimeFigureOut">
               <a:rPr lang="en-US" smtClean="0"/>
-              <a:t>11/1/17</a:t>
+              <a:t>4/14/18</a:t>
             </a:fld>
             <a:endParaRPr lang="en-US"/>
           </a:p>
@@ -1180,7 +1197,7 @@
           <a:p>
             <a:fld id="{571AC92B-1F9B-B741-93E4-1ECF27636BBF}" type="datetimeFigureOut">
               <a:rPr lang="en-US" smtClean="0"/>
-              <a:t>11/1/17</a:t>
+              <a:t>4/14/18</a:t>
             </a:fld>
             <a:endParaRPr lang="en-US"/>
           </a:p>
@@ -1419,7 +1436,7 @@
           <a:p>
             <a:fld id="{571AC92B-1F9B-B741-93E4-1ECF27636BBF}" type="datetimeFigureOut">
               <a:rPr lang="en-US" smtClean="0"/>
-              <a:t>11/1/17</a:t>
+              <a:t>4/14/18</a:t>
             </a:fld>
             <a:endParaRPr lang="en-US"/>
           </a:p>
@@ -1646,7 +1663,7 @@
           <a:p>
             <a:fld id="{571AC92B-1F9B-B741-93E4-1ECF27636BBF}" type="datetimeFigureOut">
               <a:rPr lang="en-US" smtClean="0"/>
-              <a:t>11/1/17</a:t>
+              <a:t>4/14/18</a:t>
             </a:fld>
             <a:endParaRPr lang="en-US"/>
           </a:p>
@@ -2008,7 +2025,7 @@
           <a:p>
             <a:fld id="{571AC92B-1F9B-B741-93E4-1ECF27636BBF}" type="datetimeFigureOut">
               <a:rPr lang="en-US" smtClean="0"/>
-              <a:t>11/1/17</a:t>
+              <a:t>4/14/18</a:t>
             </a:fld>
             <a:endParaRPr lang="en-US"/>
           </a:p>
@@ -2121,7 +2138,7 @@
           <a:p>
             <a:fld id="{571AC92B-1F9B-B741-93E4-1ECF27636BBF}" type="datetimeFigureOut">
               <a:rPr lang="en-US" smtClean="0"/>
-              <a:t>11/1/17</a:t>
+              <a:t>4/14/18</a:t>
             </a:fld>
             <a:endParaRPr lang="en-US"/>
           </a:p>
@@ -2211,7 +2228,7 @@
           <a:p>
             <a:fld id="{571AC92B-1F9B-B741-93E4-1ECF27636BBF}" type="datetimeFigureOut">
               <a:rPr lang="en-US" smtClean="0"/>
-              <a:t>11/1/17</a:t>
+              <a:t>4/14/18</a:t>
             </a:fld>
             <a:endParaRPr lang="en-US"/>
           </a:p>
@@ -2483,7 +2500,7 @@
           <a:p>
             <a:fld id="{571AC92B-1F9B-B741-93E4-1ECF27636BBF}" type="datetimeFigureOut">
               <a:rPr lang="en-US" smtClean="0"/>
-              <a:t>11/1/17</a:t>
+              <a:t>4/14/18</a:t>
             </a:fld>
             <a:endParaRPr lang="en-US"/>
           </a:p>
@@ -2735,7 +2752,7 @@
           <a:p>
             <a:fld id="{571AC92B-1F9B-B741-93E4-1ECF27636BBF}" type="datetimeFigureOut">
               <a:rPr lang="en-US" smtClean="0"/>
-              <a:t>11/1/17</a:t>
+              <a:t>4/14/18</a:t>
             </a:fld>
             <a:endParaRPr lang="en-US"/>
           </a:p>
@@ -2943,7 +2960,7 @@
           <a:p>
             <a:fld id="{571AC92B-1F9B-B741-93E4-1ECF27636BBF}" type="datetimeFigureOut">
               <a:rPr lang="en-US" smtClean="0"/>
-              <a:t>11/1/17</a:t>
+              <a:t>4/14/18</a:t>
             </a:fld>
             <a:endParaRPr lang="en-US"/>
           </a:p>
@@ -3831,10 +3848,316 @@
   <p:timing>
     <p:tnLst>
       <p:par>
-        <p:cTn xmlns:p14="http://schemas.microsoft.com/office/powerpoint/2010/main" id="1" dur="indefinite" restart="never" nodeType="tmRoot"/>
+        <p:cTn id="1" dur="indefinite" restart="never" nodeType="tmRoot"/>
       </p:par>
     </p:tnLst>
   </p:timing>
+</p:sld>
+</file>
+
+<file path=ppt/slides/slide2.xml><?xml version="1.0" encoding="utf-8"?>
+<p:sld xmlns:a="http://schemas.openxmlformats.org/drawingml/2006/main" xmlns:r="http://schemas.openxmlformats.org/officeDocument/2006/relationships" xmlns:p="http://schemas.openxmlformats.org/presentationml/2006/main">
+  <p:cSld>
+    <p:spTree>
+      <p:nvGrpSpPr>
+        <p:cNvPr id="1" name=""/>
+        <p:cNvGrpSpPr/>
+        <p:nvPr/>
+      </p:nvGrpSpPr>
+      <p:grpSpPr>
+        <a:xfrm>
+          <a:off x="0" y="0"/>
+          <a:ext cx="0" cy="0"/>
+          <a:chOff x="0" y="0"/>
+          <a:chExt cx="0" cy="0"/>
+        </a:xfrm>
+      </p:grpSpPr>
+      <p:pic>
+        <p:nvPicPr>
+          <p:cNvPr id="2" name="Picture 1"/>
+          <p:cNvPicPr>
+            <a:picLocks noChangeAspect="1"/>
+          </p:cNvPicPr>
+          <p:nvPr/>
+        </p:nvPicPr>
+        <p:blipFill>
+          <a:blip r:embed="rId2">
+            <a:extLst>
+              <a:ext uri="{28A0092B-C50C-407E-A947-70E740481C1C}">
+                <a14:useLocalDpi xmlns:a14="http://schemas.microsoft.com/office/drawing/2010/main" val="0"/>
+              </a:ext>
+            </a:extLst>
+          </a:blip>
+          <a:stretch>
+            <a:fillRect/>
+          </a:stretch>
+        </p:blipFill>
+        <p:spPr>
+          <a:xfrm>
+            <a:off x="108414" y="1559442"/>
+            <a:ext cx="6109823" cy="3428809"/>
+          </a:xfrm>
+          <a:prstGeom prst="rect">
+            <a:avLst/>
+          </a:prstGeom>
+        </p:spPr>
+      </p:pic>
+      <p:sp>
+        <p:nvSpPr>
+          <p:cNvPr id="3" name="Rounded Rectangle 2"/>
+          <p:cNvSpPr/>
+          <p:nvPr/>
+        </p:nvSpPr>
+        <p:spPr>
+          <a:xfrm>
+            <a:off x="233693" y="3245495"/>
+            <a:ext cx="1751052" cy="220720"/>
+          </a:xfrm>
+          <a:prstGeom prst="roundRect">
+            <a:avLst/>
+          </a:prstGeom>
+          <a:noFill/>
+          <a:ln>
+            <a:solidFill>
+              <a:srgbClr val="FF0000"/>
+            </a:solidFill>
+          </a:ln>
+        </p:spPr>
+        <p:style>
+          <a:lnRef idx="1">
+            <a:schemeClr val="accent1"/>
+          </a:lnRef>
+          <a:fillRef idx="3">
+            <a:schemeClr val="accent1"/>
+          </a:fillRef>
+          <a:effectRef idx="2">
+            <a:schemeClr val="accent1"/>
+          </a:effectRef>
+          <a:fontRef idx="minor">
+            <a:schemeClr val="lt1"/>
+          </a:fontRef>
+        </p:style>
+        <p:txBody>
+          <a:bodyPr rtlCol="0" anchor="ctr"/>
+          <a:lstStyle/>
+          <a:p>
+            <a:pPr algn="ctr"/>
+            <a:endParaRPr lang="en-US"/>
+          </a:p>
+        </p:txBody>
+      </p:sp>
+      <p:sp>
+        <p:nvSpPr>
+          <p:cNvPr id="4" name="TextBox 3"/>
+          <p:cNvSpPr txBox="1"/>
+          <p:nvPr/>
+        </p:nvSpPr>
+        <p:spPr>
+          <a:xfrm>
+            <a:off x="-63437" y="3196813"/>
+            <a:ext cx="395777" cy="276999"/>
+          </a:xfrm>
+          <a:prstGeom prst="rect">
+            <a:avLst/>
+          </a:prstGeom>
+          <a:noFill/>
+        </p:spPr>
+        <p:txBody>
+          <a:bodyPr wrap="square" rtlCol="0">
+            <a:spAutoFit/>
+          </a:bodyPr>
+          <a:lstStyle/>
+          <a:p>
+            <a:r>
+              <a:rPr lang="en-US" sz="1200" dirty="0" smtClean="0">
+                <a:solidFill>
+                  <a:srgbClr val="FF0000"/>
+                </a:solidFill>
+              </a:rPr>
+              <a:t>(2)</a:t>
+            </a:r>
+            <a:endParaRPr lang="en-US" sz="1200" dirty="0">
+              <a:solidFill>
+                <a:srgbClr val="FF0000"/>
+              </a:solidFill>
+            </a:endParaRPr>
+          </a:p>
+        </p:txBody>
+      </p:sp>
+      <p:sp>
+        <p:nvSpPr>
+          <p:cNvPr id="5" name="Rounded Rectangle 4"/>
+          <p:cNvSpPr/>
+          <p:nvPr/>
+        </p:nvSpPr>
+        <p:spPr>
+          <a:xfrm>
+            <a:off x="233693" y="3024775"/>
+            <a:ext cx="1751052" cy="220720"/>
+          </a:xfrm>
+          <a:prstGeom prst="roundRect">
+            <a:avLst/>
+          </a:prstGeom>
+          <a:noFill/>
+          <a:ln>
+            <a:solidFill>
+              <a:srgbClr val="FF0000"/>
+            </a:solidFill>
+          </a:ln>
+        </p:spPr>
+        <p:style>
+          <a:lnRef idx="1">
+            <a:schemeClr val="accent1"/>
+          </a:lnRef>
+          <a:fillRef idx="3">
+            <a:schemeClr val="accent1"/>
+          </a:fillRef>
+          <a:effectRef idx="2">
+            <a:schemeClr val="accent1"/>
+          </a:effectRef>
+          <a:fontRef idx="minor">
+            <a:schemeClr val="lt1"/>
+          </a:fontRef>
+        </p:style>
+        <p:txBody>
+          <a:bodyPr rtlCol="0" anchor="ctr"/>
+          <a:lstStyle/>
+          <a:p>
+            <a:pPr algn="ctr"/>
+            <a:endParaRPr lang="en-US"/>
+          </a:p>
+        </p:txBody>
+      </p:sp>
+      <p:sp>
+        <p:nvSpPr>
+          <p:cNvPr id="6" name="TextBox 5"/>
+          <p:cNvSpPr txBox="1"/>
+          <p:nvPr/>
+        </p:nvSpPr>
+        <p:spPr>
+          <a:xfrm>
+            <a:off x="-63437" y="2976093"/>
+            <a:ext cx="395777" cy="276999"/>
+          </a:xfrm>
+          <a:prstGeom prst="rect">
+            <a:avLst/>
+          </a:prstGeom>
+          <a:noFill/>
+        </p:spPr>
+        <p:txBody>
+          <a:bodyPr wrap="square" rtlCol="0">
+            <a:spAutoFit/>
+          </a:bodyPr>
+          <a:lstStyle/>
+          <a:p>
+            <a:r>
+              <a:rPr lang="en-US" sz="1200" dirty="0" smtClean="0">
+                <a:solidFill>
+                  <a:srgbClr val="FF0000"/>
+                </a:solidFill>
+              </a:rPr>
+              <a:t>(1)</a:t>
+            </a:r>
+            <a:endParaRPr lang="en-US" sz="1200" dirty="0">
+              <a:solidFill>
+                <a:srgbClr val="FF0000"/>
+              </a:solidFill>
+            </a:endParaRPr>
+          </a:p>
+        </p:txBody>
+      </p:sp>
+      <p:sp>
+        <p:nvSpPr>
+          <p:cNvPr id="7" name="Rounded Rectangle 6"/>
+          <p:cNvSpPr/>
+          <p:nvPr/>
+        </p:nvSpPr>
+        <p:spPr>
+          <a:xfrm>
+            <a:off x="233693" y="3673767"/>
+            <a:ext cx="1751052" cy="220720"/>
+          </a:xfrm>
+          <a:prstGeom prst="roundRect">
+            <a:avLst/>
+          </a:prstGeom>
+          <a:noFill/>
+          <a:ln>
+            <a:solidFill>
+              <a:srgbClr val="FF0000"/>
+            </a:solidFill>
+          </a:ln>
+        </p:spPr>
+        <p:style>
+          <a:lnRef idx="1">
+            <a:schemeClr val="accent1"/>
+          </a:lnRef>
+          <a:fillRef idx="3">
+            <a:schemeClr val="accent1"/>
+          </a:fillRef>
+          <a:effectRef idx="2">
+            <a:schemeClr val="accent1"/>
+          </a:effectRef>
+          <a:fontRef idx="minor">
+            <a:schemeClr val="lt1"/>
+          </a:fontRef>
+        </p:style>
+        <p:txBody>
+          <a:bodyPr rtlCol="0" anchor="ctr"/>
+          <a:lstStyle/>
+          <a:p>
+            <a:pPr algn="ctr"/>
+            <a:endParaRPr lang="en-US"/>
+          </a:p>
+        </p:txBody>
+      </p:sp>
+      <p:sp>
+        <p:nvSpPr>
+          <p:cNvPr id="8" name="TextBox 7"/>
+          <p:cNvSpPr txBox="1"/>
+          <p:nvPr/>
+        </p:nvSpPr>
+        <p:spPr>
+          <a:xfrm>
+            <a:off x="-63437" y="3625085"/>
+            <a:ext cx="395777" cy="276999"/>
+          </a:xfrm>
+          <a:prstGeom prst="rect">
+            <a:avLst/>
+          </a:prstGeom>
+          <a:noFill/>
+        </p:spPr>
+        <p:txBody>
+          <a:bodyPr wrap="square" rtlCol="0">
+            <a:spAutoFit/>
+          </a:bodyPr>
+          <a:lstStyle/>
+          <a:p>
+            <a:r>
+              <a:rPr lang="en-US" sz="1200" smtClean="0">
+                <a:solidFill>
+                  <a:srgbClr val="FF0000"/>
+                </a:solidFill>
+              </a:rPr>
+              <a:t>(3)</a:t>
+            </a:r>
+            <a:endParaRPr lang="en-US" sz="1200" dirty="0">
+              <a:solidFill>
+                <a:srgbClr val="FF0000"/>
+              </a:solidFill>
+            </a:endParaRPr>
+          </a:p>
+        </p:txBody>
+      </p:sp>
+    </p:spTree>
+    <p:extLst>
+      <p:ext uri="{BB962C8B-B14F-4D97-AF65-F5344CB8AC3E}">
+        <p14:creationId xmlns:p14="http://schemas.microsoft.com/office/powerpoint/2010/main" val="903415607"/>
+      </p:ext>
+    </p:extLst>
+  </p:cSld>
+  <p:clrMapOvr>
+    <a:masterClrMapping/>
+  </p:clrMapOvr>
 </p:sld>
 </file>
 
@@ -4093,7 +4416,7 @@
   <a:extraClrSchemeLst/>
   <a:extLst>
     <a:ext uri="{05A4C25C-085E-4340-85A3-A5531E510DB2}">
-      <thm15:themeFamily xmlns:thm15="http://schemas.microsoft.com/office/thememl/2012/main" xmlns="" name="Office Theme" id="{62F939B6-93AF-4DB8-9C6B-D6C7DFDC589F}" vid="{4A3C46E8-61CC-4603-A589-7422A47A8E4A}"/>
+      <thm15:themeFamily xmlns:thm15="http://schemas.microsoft.com/office/thememl/2012/main" name="Office Theme" id="{62F939B6-93AF-4DB8-9C6B-D6C7DFDC589F}" vid="{4A3C46E8-61CC-4603-A589-7422A47A8E4A}"/>
     </a:ext>
   </a:extLst>
 </a:theme>
@@ -4354,7 +4677,7 @@
   <a:extraClrSchemeLst/>
   <a:extLst>
     <a:ext uri="{05A4C25C-085E-4340-85A3-A5531E510DB2}">
-      <thm15:themeFamily xmlns:thm15="http://schemas.microsoft.com/office/thememl/2012/main" xmlns="" name="Office Theme" id="{62F939B6-93AF-4DB8-9C6B-D6C7DFDC589F}" vid="{4A3C46E8-61CC-4603-A589-7422A47A8E4A}"/>
+      <thm15:themeFamily xmlns:thm15="http://schemas.microsoft.com/office/thememl/2012/main" name="Office Theme" id="{62F939B6-93AF-4DB8-9C6B-D6C7DFDC589F}" vid="{4A3C46E8-61CC-4603-A589-7422A47A8E4A}"/>
     </a:ext>
   </a:extLst>
 </a:theme>

</xml_diff>

<commit_message>
update a couple of figures for the  turorial
</commit_message>
<xml_diff>
--- a/figure/preprocessing/Figure12.pptx
+++ b/figure/preprocessing/Figure12.pptx
@@ -5,14 +5,15 @@
     <p:sldMasterId id="2147483780" r:id="rId1"/>
   </p:sldMasterIdLst>
   <p:notesMasterIdLst>
-    <p:notesMasterId r:id="rId7"/>
+    <p:notesMasterId r:id="rId8"/>
   </p:notesMasterIdLst>
   <p:sldIdLst>
     <p:sldId id="257" r:id="rId2"/>
     <p:sldId id="259" r:id="rId3"/>
-    <p:sldId id="260" r:id="rId4"/>
-    <p:sldId id="261" r:id="rId5"/>
-    <p:sldId id="262" r:id="rId6"/>
+    <p:sldId id="263" r:id="rId4"/>
+    <p:sldId id="260" r:id="rId5"/>
+    <p:sldId id="261" r:id="rId6"/>
+    <p:sldId id="262" r:id="rId7"/>
   </p:sldIdLst>
   <p:sldSz cx="6218238" cy="6492875"/>
   <p:notesSz cx="6858000" cy="9144000"/>
@@ -212,7 +213,7 @@
           <a:p>
             <a:fld id="{86C8C9D3-7DBA-5A45-9986-071634E7074B}" type="datetimeFigureOut">
               <a:rPr lang="en-US" smtClean="0"/>
-              <a:t>4/15/18</a:t>
+              <a:t>9/6/18</a:t>
             </a:fld>
             <a:endParaRPr lang="en-US"/>
           </a:p>
@@ -276,38 +277,37 @@
           <a:p>
             <a:pPr lvl="0"/>
             <a:r>
-              <a:rPr lang="en-US" smtClean="0"/>
+              <a:rPr lang="en-US"/>
               <a:t>Click to edit Master text styles</a:t>
             </a:r>
           </a:p>
           <a:p>
             <a:pPr lvl="1"/>
             <a:r>
-              <a:rPr lang="en-US" smtClean="0"/>
+              <a:rPr lang="en-US"/>
               <a:t>Second level</a:t>
             </a:r>
           </a:p>
           <a:p>
             <a:pPr lvl="2"/>
             <a:r>
-              <a:rPr lang="en-US" smtClean="0"/>
+              <a:rPr lang="en-US"/>
               <a:t>Third level</a:t>
             </a:r>
           </a:p>
           <a:p>
             <a:pPr lvl="3"/>
             <a:r>
-              <a:rPr lang="en-US" smtClean="0"/>
+              <a:rPr lang="en-US"/>
               <a:t>Fourth level</a:t>
             </a:r>
           </a:p>
           <a:p>
             <a:pPr lvl="4"/>
             <a:r>
-              <a:rPr lang="en-US" smtClean="0"/>
+              <a:rPr lang="en-US"/>
               <a:t>Fifth level</a:t>
             </a:r>
-            <a:endParaRPr lang="en-US"/>
           </a:p>
         </p:txBody>
       </p:sp>
@@ -606,7 +606,7 @@
           </a:lstStyle>
           <a:p>
             <a:r>
-              <a:rPr lang="en-US" smtClean="0"/>
+              <a:rPr lang="en-US"/>
               <a:t>Click to edit Master title style</a:t>
             </a:r>
             <a:endParaRPr lang="en-US" dirty="0"/>
@@ -671,7 +671,7 @@
           </a:lstStyle>
           <a:p>
             <a:r>
-              <a:rPr lang="en-US" smtClean="0"/>
+              <a:rPr lang="en-US"/>
               <a:t>Click to edit Master subtitle style</a:t>
             </a:r>
             <a:endParaRPr lang="en-US" dirty="0"/>
@@ -695,7 +695,7 @@
           <a:p>
             <a:fld id="{571AC92B-1F9B-B741-93E4-1ECF27636BBF}" type="datetimeFigureOut">
               <a:rPr lang="en-US" smtClean="0"/>
-              <a:t>4/15/18</a:t>
+              <a:t>9/6/18</a:t>
             </a:fld>
             <a:endParaRPr lang="en-US"/>
           </a:p>
@@ -784,7 +784,7 @@
           <a:lstStyle/>
           <a:p>
             <a:r>
-              <a:rPr lang="en-US" smtClean="0"/>
+              <a:rPr lang="en-US"/>
               <a:t>Click to edit Master title style</a:t>
             </a:r>
             <a:endParaRPr lang="en-US" dirty="0"/>
@@ -808,35 +808,35 @@
           <a:p>
             <a:pPr lvl="0"/>
             <a:r>
-              <a:rPr lang="en-US" smtClean="0"/>
+              <a:rPr lang="en-US"/>
               <a:t>Click to edit Master text styles</a:t>
             </a:r>
           </a:p>
           <a:p>
             <a:pPr lvl="1"/>
             <a:r>
-              <a:rPr lang="en-US" smtClean="0"/>
+              <a:rPr lang="en-US"/>
               <a:t>Second level</a:t>
             </a:r>
           </a:p>
           <a:p>
             <a:pPr lvl="2"/>
             <a:r>
-              <a:rPr lang="en-US" smtClean="0"/>
+              <a:rPr lang="en-US"/>
               <a:t>Third level</a:t>
             </a:r>
           </a:p>
           <a:p>
             <a:pPr lvl="3"/>
             <a:r>
-              <a:rPr lang="en-US" smtClean="0"/>
+              <a:rPr lang="en-US"/>
               <a:t>Fourth level</a:t>
             </a:r>
           </a:p>
           <a:p>
             <a:pPr lvl="4"/>
             <a:r>
-              <a:rPr lang="en-US" smtClean="0"/>
+              <a:rPr lang="en-US"/>
               <a:t>Fifth level</a:t>
             </a:r>
             <a:endParaRPr lang="en-US" dirty="0"/>
@@ -860,7 +860,7 @@
           <a:p>
             <a:fld id="{571AC92B-1F9B-B741-93E4-1ECF27636BBF}" type="datetimeFigureOut">
               <a:rPr lang="en-US" smtClean="0"/>
-              <a:t>4/15/18</a:t>
+              <a:t>9/6/18</a:t>
             </a:fld>
             <a:endParaRPr lang="en-US"/>
           </a:p>
@@ -954,7 +954,7 @@
           <a:lstStyle/>
           <a:p>
             <a:r>
-              <a:rPr lang="en-US" smtClean="0"/>
+              <a:rPr lang="en-US"/>
               <a:t>Click to edit Master title style</a:t>
             </a:r>
             <a:endParaRPr lang="en-US" dirty="0"/>
@@ -983,35 +983,35 @@
           <a:p>
             <a:pPr lvl="0"/>
             <a:r>
-              <a:rPr lang="en-US" smtClean="0"/>
+              <a:rPr lang="en-US"/>
               <a:t>Click to edit Master text styles</a:t>
             </a:r>
           </a:p>
           <a:p>
             <a:pPr lvl="1"/>
             <a:r>
-              <a:rPr lang="en-US" smtClean="0"/>
+              <a:rPr lang="en-US"/>
               <a:t>Second level</a:t>
             </a:r>
           </a:p>
           <a:p>
             <a:pPr lvl="2"/>
             <a:r>
-              <a:rPr lang="en-US" smtClean="0"/>
+              <a:rPr lang="en-US"/>
               <a:t>Third level</a:t>
             </a:r>
           </a:p>
           <a:p>
             <a:pPr lvl="3"/>
             <a:r>
-              <a:rPr lang="en-US" smtClean="0"/>
+              <a:rPr lang="en-US"/>
               <a:t>Fourth level</a:t>
             </a:r>
           </a:p>
           <a:p>
             <a:pPr lvl="4"/>
             <a:r>
-              <a:rPr lang="en-US" smtClean="0"/>
+              <a:rPr lang="en-US"/>
               <a:t>Fifth level</a:t>
             </a:r>
             <a:endParaRPr lang="en-US" dirty="0"/>
@@ -1035,7 +1035,7 @@
           <a:p>
             <a:fld id="{571AC92B-1F9B-B741-93E4-1ECF27636BBF}" type="datetimeFigureOut">
               <a:rPr lang="en-US" smtClean="0"/>
-              <a:t>4/15/18</a:t>
+              <a:t>9/6/18</a:t>
             </a:fld>
             <a:endParaRPr lang="en-US"/>
           </a:p>
@@ -1124,7 +1124,7 @@
           <a:lstStyle/>
           <a:p>
             <a:r>
-              <a:rPr lang="en-US" smtClean="0"/>
+              <a:rPr lang="en-US"/>
               <a:t>Click to edit Master title style</a:t>
             </a:r>
             <a:endParaRPr lang="en-US" dirty="0"/>
@@ -1148,35 +1148,35 @@
           <a:p>
             <a:pPr lvl="0"/>
             <a:r>
-              <a:rPr lang="en-US" smtClean="0"/>
+              <a:rPr lang="en-US"/>
               <a:t>Click to edit Master text styles</a:t>
             </a:r>
           </a:p>
           <a:p>
             <a:pPr lvl="1"/>
             <a:r>
-              <a:rPr lang="en-US" smtClean="0"/>
+              <a:rPr lang="en-US"/>
               <a:t>Second level</a:t>
             </a:r>
           </a:p>
           <a:p>
             <a:pPr lvl="2"/>
             <a:r>
-              <a:rPr lang="en-US" smtClean="0"/>
+              <a:rPr lang="en-US"/>
               <a:t>Third level</a:t>
             </a:r>
           </a:p>
           <a:p>
             <a:pPr lvl="3"/>
             <a:r>
-              <a:rPr lang="en-US" smtClean="0"/>
+              <a:rPr lang="en-US"/>
               <a:t>Fourth level</a:t>
             </a:r>
           </a:p>
           <a:p>
             <a:pPr lvl="4"/>
             <a:r>
-              <a:rPr lang="en-US" smtClean="0"/>
+              <a:rPr lang="en-US"/>
               <a:t>Fifth level</a:t>
             </a:r>
             <a:endParaRPr lang="en-US" dirty="0"/>
@@ -1200,7 +1200,7 @@
           <a:p>
             <a:fld id="{571AC92B-1F9B-B741-93E4-1ECF27636BBF}" type="datetimeFigureOut">
               <a:rPr lang="en-US" smtClean="0"/>
-              <a:t>4/15/18</a:t>
+              <a:t>9/6/18</a:t>
             </a:fld>
             <a:endParaRPr lang="en-US"/>
           </a:p>
@@ -1298,7 +1298,7 @@
           </a:lstStyle>
           <a:p>
             <a:r>
-              <a:rPr lang="en-US" smtClean="0"/>
+              <a:rPr lang="en-US"/>
               <a:t>Click to edit Master title style</a:t>
             </a:r>
             <a:endParaRPr lang="en-US" dirty="0"/>
@@ -1416,7 +1416,7 @@
           <a:p>
             <a:pPr lvl="0"/>
             <a:r>
-              <a:rPr lang="en-US" smtClean="0"/>
+              <a:rPr lang="en-US"/>
               <a:t>Click to edit Master text styles</a:t>
             </a:r>
           </a:p>
@@ -1439,7 +1439,7 @@
           <a:p>
             <a:fld id="{571AC92B-1F9B-B741-93E4-1ECF27636BBF}" type="datetimeFigureOut">
               <a:rPr lang="en-US" smtClean="0"/>
-              <a:t>4/15/18</a:t>
+              <a:t>9/6/18</a:t>
             </a:fld>
             <a:endParaRPr lang="en-US"/>
           </a:p>
@@ -1528,7 +1528,7 @@
           <a:lstStyle/>
           <a:p>
             <a:r>
-              <a:rPr lang="en-US" smtClean="0"/>
+              <a:rPr lang="en-US"/>
               <a:t>Click to edit Master title style</a:t>
             </a:r>
             <a:endParaRPr lang="en-US" dirty="0"/>
@@ -1557,35 +1557,35 @@
           <a:p>
             <a:pPr lvl="0"/>
             <a:r>
-              <a:rPr lang="en-US" smtClean="0"/>
+              <a:rPr lang="en-US"/>
               <a:t>Click to edit Master text styles</a:t>
             </a:r>
           </a:p>
           <a:p>
             <a:pPr lvl="1"/>
             <a:r>
-              <a:rPr lang="en-US" smtClean="0"/>
+              <a:rPr lang="en-US"/>
               <a:t>Second level</a:t>
             </a:r>
           </a:p>
           <a:p>
             <a:pPr lvl="2"/>
             <a:r>
-              <a:rPr lang="en-US" smtClean="0"/>
+              <a:rPr lang="en-US"/>
               <a:t>Third level</a:t>
             </a:r>
           </a:p>
           <a:p>
             <a:pPr lvl="3"/>
             <a:r>
-              <a:rPr lang="en-US" smtClean="0"/>
+              <a:rPr lang="en-US"/>
               <a:t>Fourth level</a:t>
             </a:r>
           </a:p>
           <a:p>
             <a:pPr lvl="4"/>
             <a:r>
-              <a:rPr lang="en-US" smtClean="0"/>
+              <a:rPr lang="en-US"/>
               <a:t>Fifth level</a:t>
             </a:r>
             <a:endParaRPr lang="en-US" dirty="0"/>
@@ -1614,35 +1614,35 @@
           <a:p>
             <a:pPr lvl="0"/>
             <a:r>
-              <a:rPr lang="en-US" smtClean="0"/>
+              <a:rPr lang="en-US"/>
               <a:t>Click to edit Master text styles</a:t>
             </a:r>
           </a:p>
           <a:p>
             <a:pPr lvl="1"/>
             <a:r>
-              <a:rPr lang="en-US" smtClean="0"/>
+              <a:rPr lang="en-US"/>
               <a:t>Second level</a:t>
             </a:r>
           </a:p>
           <a:p>
             <a:pPr lvl="2"/>
             <a:r>
-              <a:rPr lang="en-US" smtClean="0"/>
+              <a:rPr lang="en-US"/>
               <a:t>Third level</a:t>
             </a:r>
           </a:p>
           <a:p>
             <a:pPr lvl="3"/>
             <a:r>
-              <a:rPr lang="en-US" smtClean="0"/>
+              <a:rPr lang="en-US"/>
               <a:t>Fourth level</a:t>
             </a:r>
           </a:p>
           <a:p>
             <a:pPr lvl="4"/>
             <a:r>
-              <a:rPr lang="en-US" smtClean="0"/>
+              <a:rPr lang="en-US"/>
               <a:t>Fifth level</a:t>
             </a:r>
             <a:endParaRPr lang="en-US" dirty="0"/>
@@ -1666,7 +1666,7 @@
           <a:p>
             <a:fld id="{571AC92B-1F9B-B741-93E4-1ECF27636BBF}" type="datetimeFigureOut">
               <a:rPr lang="en-US" smtClean="0"/>
-              <a:t>4/15/18</a:t>
+              <a:t>9/6/18</a:t>
             </a:fld>
             <a:endParaRPr lang="en-US"/>
           </a:p>
@@ -1760,7 +1760,7 @@
           <a:lstStyle/>
           <a:p>
             <a:r>
-              <a:rPr lang="en-US" smtClean="0"/>
+              <a:rPr lang="en-US"/>
               <a:t>Click to edit Master title style</a:t>
             </a:r>
             <a:endParaRPr lang="en-US" dirty="0"/>
@@ -1826,7 +1826,7 @@
           <a:p>
             <a:pPr lvl="0"/>
             <a:r>
-              <a:rPr lang="en-US" smtClean="0"/>
+              <a:rPr lang="en-US"/>
               <a:t>Click to edit Master text styles</a:t>
             </a:r>
           </a:p>
@@ -1854,35 +1854,35 @@
           <a:p>
             <a:pPr lvl="0"/>
             <a:r>
-              <a:rPr lang="en-US" smtClean="0"/>
+              <a:rPr lang="en-US"/>
               <a:t>Click to edit Master text styles</a:t>
             </a:r>
           </a:p>
           <a:p>
             <a:pPr lvl="1"/>
             <a:r>
-              <a:rPr lang="en-US" smtClean="0"/>
+              <a:rPr lang="en-US"/>
               <a:t>Second level</a:t>
             </a:r>
           </a:p>
           <a:p>
             <a:pPr lvl="2"/>
             <a:r>
-              <a:rPr lang="en-US" smtClean="0"/>
+              <a:rPr lang="en-US"/>
               <a:t>Third level</a:t>
             </a:r>
           </a:p>
           <a:p>
             <a:pPr lvl="3"/>
             <a:r>
-              <a:rPr lang="en-US" smtClean="0"/>
+              <a:rPr lang="en-US"/>
               <a:t>Fourth level</a:t>
             </a:r>
           </a:p>
           <a:p>
             <a:pPr lvl="4"/>
             <a:r>
-              <a:rPr lang="en-US" smtClean="0"/>
+              <a:rPr lang="en-US"/>
               <a:t>Fifth level</a:t>
             </a:r>
             <a:endParaRPr lang="en-US" dirty="0"/>
@@ -1948,7 +1948,7 @@
           <a:p>
             <a:pPr lvl="0"/>
             <a:r>
-              <a:rPr lang="en-US" smtClean="0"/>
+              <a:rPr lang="en-US"/>
               <a:t>Click to edit Master text styles</a:t>
             </a:r>
           </a:p>
@@ -1976,35 +1976,35 @@
           <a:p>
             <a:pPr lvl="0"/>
             <a:r>
-              <a:rPr lang="en-US" smtClean="0"/>
+              <a:rPr lang="en-US"/>
               <a:t>Click to edit Master text styles</a:t>
             </a:r>
           </a:p>
           <a:p>
             <a:pPr lvl="1"/>
             <a:r>
-              <a:rPr lang="en-US" smtClean="0"/>
+              <a:rPr lang="en-US"/>
               <a:t>Second level</a:t>
             </a:r>
           </a:p>
           <a:p>
             <a:pPr lvl="2"/>
             <a:r>
-              <a:rPr lang="en-US" smtClean="0"/>
+              <a:rPr lang="en-US"/>
               <a:t>Third level</a:t>
             </a:r>
           </a:p>
           <a:p>
             <a:pPr lvl="3"/>
             <a:r>
-              <a:rPr lang="en-US" smtClean="0"/>
+              <a:rPr lang="en-US"/>
               <a:t>Fourth level</a:t>
             </a:r>
           </a:p>
           <a:p>
             <a:pPr lvl="4"/>
             <a:r>
-              <a:rPr lang="en-US" smtClean="0"/>
+              <a:rPr lang="en-US"/>
               <a:t>Fifth level</a:t>
             </a:r>
             <a:endParaRPr lang="en-US" dirty="0"/>
@@ -2028,7 +2028,7 @@
           <a:p>
             <a:fld id="{571AC92B-1F9B-B741-93E4-1ECF27636BBF}" type="datetimeFigureOut">
               <a:rPr lang="en-US" smtClean="0"/>
-              <a:t>4/15/18</a:t>
+              <a:t>9/6/18</a:t>
             </a:fld>
             <a:endParaRPr lang="en-US"/>
           </a:p>
@@ -2117,7 +2117,7 @@
           <a:lstStyle/>
           <a:p>
             <a:r>
-              <a:rPr lang="en-US" smtClean="0"/>
+              <a:rPr lang="en-US"/>
               <a:t>Click to edit Master title style</a:t>
             </a:r>
             <a:endParaRPr lang="en-US" dirty="0"/>
@@ -2141,7 +2141,7 @@
           <a:p>
             <a:fld id="{571AC92B-1F9B-B741-93E4-1ECF27636BBF}" type="datetimeFigureOut">
               <a:rPr lang="en-US" smtClean="0"/>
-              <a:t>4/15/18</a:t>
+              <a:t>9/6/18</a:t>
             </a:fld>
             <a:endParaRPr lang="en-US"/>
           </a:p>
@@ -2231,7 +2231,7 @@
           <a:p>
             <a:fld id="{571AC92B-1F9B-B741-93E4-1ECF27636BBF}" type="datetimeFigureOut">
               <a:rPr lang="en-US" smtClean="0"/>
-              <a:t>4/15/18</a:t>
+              <a:t>9/6/18</a:t>
             </a:fld>
             <a:endParaRPr lang="en-US"/>
           </a:p>
@@ -2329,7 +2329,7 @@
           </a:lstStyle>
           <a:p>
             <a:r>
-              <a:rPr lang="en-US" smtClean="0"/>
+              <a:rPr lang="en-US"/>
               <a:t>Click to edit Master title style</a:t>
             </a:r>
             <a:endParaRPr lang="en-US" dirty="0"/>
@@ -2386,35 +2386,35 @@
           <a:p>
             <a:pPr lvl="0"/>
             <a:r>
-              <a:rPr lang="en-US" smtClean="0"/>
+              <a:rPr lang="en-US"/>
               <a:t>Click to edit Master text styles</a:t>
             </a:r>
           </a:p>
           <a:p>
             <a:pPr lvl="1"/>
             <a:r>
-              <a:rPr lang="en-US" smtClean="0"/>
+              <a:rPr lang="en-US"/>
               <a:t>Second level</a:t>
             </a:r>
           </a:p>
           <a:p>
             <a:pPr lvl="2"/>
             <a:r>
-              <a:rPr lang="en-US" smtClean="0"/>
+              <a:rPr lang="en-US"/>
               <a:t>Third level</a:t>
             </a:r>
           </a:p>
           <a:p>
             <a:pPr lvl="3"/>
             <a:r>
-              <a:rPr lang="en-US" smtClean="0"/>
+              <a:rPr lang="en-US"/>
               <a:t>Fourth level</a:t>
             </a:r>
           </a:p>
           <a:p>
             <a:pPr lvl="4"/>
             <a:r>
-              <a:rPr lang="en-US" smtClean="0"/>
+              <a:rPr lang="en-US"/>
               <a:t>Fifth level</a:t>
             </a:r>
             <a:endParaRPr lang="en-US" dirty="0"/>
@@ -2480,7 +2480,7 @@
           <a:p>
             <a:pPr lvl="0"/>
             <a:r>
-              <a:rPr lang="en-US" smtClean="0"/>
+              <a:rPr lang="en-US"/>
               <a:t>Click to edit Master text styles</a:t>
             </a:r>
           </a:p>
@@ -2503,7 +2503,7 @@
           <a:p>
             <a:fld id="{571AC92B-1F9B-B741-93E4-1ECF27636BBF}" type="datetimeFigureOut">
               <a:rPr lang="en-US" smtClean="0"/>
-              <a:t>4/15/18</a:t>
+              <a:t>9/6/18</a:t>
             </a:fld>
             <a:endParaRPr lang="en-US"/>
           </a:p>
@@ -2601,7 +2601,7 @@
           </a:lstStyle>
           <a:p>
             <a:r>
-              <a:rPr lang="en-US" smtClean="0"/>
+              <a:rPr lang="en-US"/>
               <a:t>Click to edit Master title style</a:t>
             </a:r>
             <a:endParaRPr lang="en-US" dirty="0"/>
@@ -2666,7 +2666,7 @@
           </a:lstStyle>
           <a:p>
             <a:r>
-              <a:rPr lang="en-US" smtClean="0"/>
+              <a:rPr lang="en-US"/>
               <a:t>Drag picture to placeholder or click icon to add</a:t>
             </a:r>
             <a:endParaRPr lang="en-US" dirty="0"/>
@@ -2732,7 +2732,7 @@
           <a:p>
             <a:pPr lvl="0"/>
             <a:r>
-              <a:rPr lang="en-US" smtClean="0"/>
+              <a:rPr lang="en-US"/>
               <a:t>Click to edit Master text styles</a:t>
             </a:r>
           </a:p>
@@ -2755,7 +2755,7 @@
           <a:p>
             <a:fld id="{571AC92B-1F9B-B741-93E4-1ECF27636BBF}" type="datetimeFigureOut">
               <a:rPr lang="en-US" smtClean="0"/>
-              <a:t>4/15/18</a:t>
+              <a:t>9/6/18</a:t>
             </a:fld>
             <a:endParaRPr lang="en-US"/>
           </a:p>
@@ -2859,7 +2859,7 @@
           <a:lstStyle/>
           <a:p>
             <a:r>
-              <a:rPr lang="en-US" smtClean="0"/>
+              <a:rPr lang="en-US"/>
               <a:t>Click to edit Master title style</a:t>
             </a:r>
             <a:endParaRPr lang="en-US" dirty="0"/>
@@ -2893,35 +2893,35 @@
           <a:p>
             <a:pPr lvl="0"/>
             <a:r>
-              <a:rPr lang="en-US" smtClean="0"/>
+              <a:rPr lang="en-US"/>
               <a:t>Click to edit Master text styles</a:t>
             </a:r>
           </a:p>
           <a:p>
             <a:pPr lvl="1"/>
             <a:r>
-              <a:rPr lang="en-US" smtClean="0"/>
+              <a:rPr lang="en-US"/>
               <a:t>Second level</a:t>
             </a:r>
           </a:p>
           <a:p>
             <a:pPr lvl="2"/>
             <a:r>
-              <a:rPr lang="en-US" smtClean="0"/>
+              <a:rPr lang="en-US"/>
               <a:t>Third level</a:t>
             </a:r>
           </a:p>
           <a:p>
             <a:pPr lvl="3"/>
             <a:r>
-              <a:rPr lang="en-US" smtClean="0"/>
+              <a:rPr lang="en-US"/>
               <a:t>Fourth level</a:t>
             </a:r>
           </a:p>
           <a:p>
             <a:pPr lvl="4"/>
             <a:r>
-              <a:rPr lang="en-US" smtClean="0"/>
+              <a:rPr lang="en-US"/>
               <a:t>Fifth level</a:t>
             </a:r>
             <a:endParaRPr lang="en-US" dirty="0"/>
@@ -2963,7 +2963,7 @@
           <a:p>
             <a:fld id="{571AC92B-1F9B-B741-93E4-1ECF27636BBF}" type="datetimeFigureOut">
               <a:rPr lang="en-US" smtClean="0"/>
-              <a:t>4/15/18</a:t>
+              <a:t>9/6/18</a:t>
             </a:fld>
             <a:endParaRPr lang="en-US"/>
           </a:p>
@@ -3495,18 +3495,13 @@
           <a:lstStyle/>
           <a:p>
             <a:r>
-              <a:rPr lang="en-US" sz="1200" dirty="0" smtClean="0">
+              <a:rPr lang="en-US" sz="1200" dirty="0">
                 <a:solidFill>
                   <a:srgbClr val="FF0000"/>
                 </a:solidFill>
               </a:rPr>
               <a:t>(1)</a:t>
             </a:r>
-            <a:endParaRPr lang="en-US" sz="1200" dirty="0">
-              <a:solidFill>
-                <a:srgbClr val="FF0000"/>
-              </a:solidFill>
-            </a:endParaRPr>
           </a:p>
         </p:txBody>
       </p:sp>
@@ -3577,18 +3572,13 @@
           <a:lstStyle/>
           <a:p>
             <a:r>
-              <a:rPr lang="en-US" sz="1200" dirty="0" smtClean="0">
+              <a:rPr lang="en-US" sz="1200" dirty="0">
                 <a:solidFill>
                   <a:srgbClr val="FF0000"/>
                 </a:solidFill>
               </a:rPr>
               <a:t>(2)</a:t>
             </a:r>
-            <a:endParaRPr lang="en-US" sz="1200" dirty="0">
-              <a:solidFill>
-                <a:srgbClr val="FF0000"/>
-              </a:solidFill>
-            </a:endParaRPr>
           </a:p>
         </p:txBody>
       </p:sp>
@@ -3659,18 +3649,13 @@
           <a:lstStyle/>
           <a:p>
             <a:r>
-              <a:rPr lang="en-US" sz="1200" dirty="0" smtClean="0">
+              <a:rPr lang="en-US" sz="1200" dirty="0">
                 <a:solidFill>
                   <a:srgbClr val="FF0000"/>
                 </a:solidFill>
               </a:rPr>
               <a:t>(3)</a:t>
             </a:r>
-            <a:endParaRPr lang="en-US" sz="1200" dirty="0">
-              <a:solidFill>
-                <a:srgbClr val="FF0000"/>
-              </a:solidFill>
-            </a:endParaRPr>
           </a:p>
         </p:txBody>
       </p:sp>
@@ -3741,18 +3726,13 @@
           <a:lstStyle/>
           <a:p>
             <a:r>
-              <a:rPr lang="en-US" sz="1200" dirty="0" smtClean="0">
+              <a:rPr lang="en-US" sz="1200" dirty="0">
                 <a:solidFill>
                   <a:srgbClr val="FF0000"/>
                 </a:solidFill>
               </a:rPr>
               <a:t>(5)</a:t>
             </a:r>
-            <a:endParaRPr lang="en-US" sz="1200" dirty="0">
-              <a:solidFill>
-                <a:srgbClr val="FF0000"/>
-              </a:solidFill>
-            </a:endParaRPr>
           </a:p>
         </p:txBody>
       </p:sp>
@@ -3823,18 +3803,13 @@
           <a:lstStyle/>
           <a:p>
             <a:r>
-              <a:rPr lang="en-US" sz="1200" dirty="0" smtClean="0">
+              <a:rPr lang="en-US" sz="1200" dirty="0">
                 <a:solidFill>
                   <a:srgbClr val="FF0000"/>
                 </a:solidFill>
               </a:rPr>
               <a:t>(4)</a:t>
             </a:r>
-            <a:endParaRPr lang="en-US" sz="1200" dirty="0">
-              <a:solidFill>
-                <a:srgbClr val="FF0000"/>
-              </a:solidFill>
-            </a:endParaRPr>
           </a:p>
         </p:txBody>
       </p:sp>
@@ -3848,13 +3823,6 @@
   <p:clrMapOvr>
     <a:masterClrMapping/>
   </p:clrMapOvr>
-  <p:timing>
-    <p:tnLst>
-      <p:par>
-        <p:cTn id="1" dur="indefinite" restart="never" nodeType="tmRoot"/>
-      </p:par>
-    </p:tnLst>
-  </p:timing>
 </p:sld>
 </file>
 
@@ -3972,18 +3940,13 @@
           <a:lstStyle/>
           <a:p>
             <a:r>
-              <a:rPr lang="en-US" sz="1200" dirty="0" smtClean="0">
+              <a:rPr lang="en-US" sz="1200" dirty="0">
                 <a:solidFill>
                   <a:srgbClr val="FF0000"/>
                 </a:solidFill>
               </a:rPr>
               <a:t>(2)</a:t>
             </a:r>
-            <a:endParaRPr lang="en-US" sz="1200" dirty="0">
-              <a:solidFill>
-                <a:srgbClr val="FF0000"/>
-              </a:solidFill>
-            </a:endParaRPr>
           </a:p>
         </p:txBody>
       </p:sp>
@@ -4054,18 +4017,13 @@
           <a:lstStyle/>
           <a:p>
             <a:r>
-              <a:rPr lang="en-US" sz="1200" dirty="0" smtClean="0">
+              <a:rPr lang="en-US" sz="1200" dirty="0">
                 <a:solidFill>
                   <a:srgbClr val="FF0000"/>
                 </a:solidFill>
               </a:rPr>
               <a:t>(1)</a:t>
             </a:r>
-            <a:endParaRPr lang="en-US" sz="1200" dirty="0">
-              <a:solidFill>
-                <a:srgbClr val="FF0000"/>
-              </a:solidFill>
-            </a:endParaRPr>
           </a:p>
         </p:txBody>
       </p:sp>
@@ -4136,7 +4094,7 @@
           <a:lstStyle/>
           <a:p>
             <a:r>
-              <a:rPr lang="en-US" sz="1200" smtClean="0">
+              <a:rPr lang="en-US" sz="1200">
                 <a:solidFill>
                   <a:srgbClr val="FF0000"/>
                 </a:solidFill>
@@ -4165,6 +4123,302 @@
 </file>
 
 <file path=ppt/slides/slide3.xml><?xml version="1.0" encoding="utf-8"?>
+<p:sld xmlns:a="http://schemas.openxmlformats.org/drawingml/2006/main" xmlns:r="http://schemas.openxmlformats.org/officeDocument/2006/relationships" xmlns:p="http://schemas.openxmlformats.org/presentationml/2006/main">
+  <p:cSld>
+    <p:spTree>
+      <p:nvGrpSpPr>
+        <p:cNvPr id="1" name=""/>
+        <p:cNvGrpSpPr/>
+        <p:nvPr/>
+      </p:nvGrpSpPr>
+      <p:grpSpPr>
+        <a:xfrm>
+          <a:off x="0" y="0"/>
+          <a:ext cx="0" cy="0"/>
+          <a:chOff x="0" y="0"/>
+          <a:chExt cx="0" cy="0"/>
+        </a:xfrm>
+      </p:grpSpPr>
+      <p:pic>
+        <p:nvPicPr>
+          <p:cNvPr id="10" name="Picture 9">
+            <a:extLst>
+              <a:ext uri="{FF2B5EF4-FFF2-40B4-BE49-F238E27FC236}">
+                <a16:creationId xmlns:a16="http://schemas.microsoft.com/office/drawing/2014/main" id="{C1EE9865-C9FA-0247-9916-406941EFCA48}"/>
+              </a:ext>
+            </a:extLst>
+          </p:cNvPr>
+          <p:cNvPicPr>
+            <a:picLocks noChangeAspect="1"/>
+          </p:cNvPicPr>
+          <p:nvPr/>
+        </p:nvPicPr>
+        <p:blipFill>
+          <a:blip r:embed="rId2"/>
+          <a:stretch>
+            <a:fillRect/>
+          </a:stretch>
+        </p:blipFill>
+        <p:spPr>
+          <a:xfrm>
+            <a:off x="118074" y="1351109"/>
+            <a:ext cx="6062063" cy="3695454"/>
+          </a:xfrm>
+          <a:prstGeom prst="rect">
+            <a:avLst/>
+          </a:prstGeom>
+        </p:spPr>
+      </p:pic>
+      <p:sp>
+        <p:nvSpPr>
+          <p:cNvPr id="3" name="Rounded Rectangle 2"/>
+          <p:cNvSpPr/>
+          <p:nvPr/>
+        </p:nvSpPr>
+        <p:spPr>
+          <a:xfrm>
+            <a:off x="233693" y="3245495"/>
+            <a:ext cx="1751052" cy="220720"/>
+          </a:xfrm>
+          <a:prstGeom prst="roundRect">
+            <a:avLst/>
+          </a:prstGeom>
+          <a:noFill/>
+          <a:ln>
+            <a:solidFill>
+              <a:srgbClr val="FF0000"/>
+            </a:solidFill>
+          </a:ln>
+        </p:spPr>
+        <p:style>
+          <a:lnRef idx="1">
+            <a:schemeClr val="accent1"/>
+          </a:lnRef>
+          <a:fillRef idx="3">
+            <a:schemeClr val="accent1"/>
+          </a:fillRef>
+          <a:effectRef idx="2">
+            <a:schemeClr val="accent1"/>
+          </a:effectRef>
+          <a:fontRef idx="minor">
+            <a:schemeClr val="lt1"/>
+          </a:fontRef>
+        </p:style>
+        <p:txBody>
+          <a:bodyPr rtlCol="0" anchor="ctr"/>
+          <a:lstStyle/>
+          <a:p>
+            <a:pPr algn="ctr"/>
+            <a:endParaRPr lang="en-US"/>
+          </a:p>
+        </p:txBody>
+      </p:sp>
+      <p:sp>
+        <p:nvSpPr>
+          <p:cNvPr id="4" name="TextBox 3"/>
+          <p:cNvSpPr txBox="1"/>
+          <p:nvPr/>
+        </p:nvSpPr>
+        <p:spPr>
+          <a:xfrm>
+            <a:off x="-63437" y="3196813"/>
+            <a:ext cx="395777" cy="276999"/>
+          </a:xfrm>
+          <a:prstGeom prst="rect">
+            <a:avLst/>
+          </a:prstGeom>
+          <a:noFill/>
+        </p:spPr>
+        <p:txBody>
+          <a:bodyPr wrap="square" rtlCol="0">
+            <a:spAutoFit/>
+          </a:bodyPr>
+          <a:lstStyle/>
+          <a:p>
+            <a:r>
+              <a:rPr lang="en-US" sz="1200" dirty="0">
+                <a:solidFill>
+                  <a:srgbClr val="FF0000"/>
+                </a:solidFill>
+              </a:rPr>
+              <a:t>(2)</a:t>
+            </a:r>
+          </a:p>
+        </p:txBody>
+      </p:sp>
+      <p:sp>
+        <p:nvSpPr>
+          <p:cNvPr id="5" name="Rounded Rectangle 4"/>
+          <p:cNvSpPr/>
+          <p:nvPr/>
+        </p:nvSpPr>
+        <p:spPr>
+          <a:xfrm>
+            <a:off x="233693" y="3024775"/>
+            <a:ext cx="1751052" cy="220720"/>
+          </a:xfrm>
+          <a:prstGeom prst="roundRect">
+            <a:avLst/>
+          </a:prstGeom>
+          <a:noFill/>
+          <a:ln>
+            <a:solidFill>
+              <a:srgbClr val="FF0000"/>
+            </a:solidFill>
+          </a:ln>
+        </p:spPr>
+        <p:style>
+          <a:lnRef idx="1">
+            <a:schemeClr val="accent1"/>
+          </a:lnRef>
+          <a:fillRef idx="3">
+            <a:schemeClr val="accent1"/>
+          </a:fillRef>
+          <a:effectRef idx="2">
+            <a:schemeClr val="accent1"/>
+          </a:effectRef>
+          <a:fontRef idx="minor">
+            <a:schemeClr val="lt1"/>
+          </a:fontRef>
+        </p:style>
+        <p:txBody>
+          <a:bodyPr rtlCol="0" anchor="ctr"/>
+          <a:lstStyle/>
+          <a:p>
+            <a:pPr algn="ctr"/>
+            <a:endParaRPr lang="en-US"/>
+          </a:p>
+        </p:txBody>
+      </p:sp>
+      <p:sp>
+        <p:nvSpPr>
+          <p:cNvPr id="6" name="TextBox 5"/>
+          <p:cNvSpPr txBox="1"/>
+          <p:nvPr/>
+        </p:nvSpPr>
+        <p:spPr>
+          <a:xfrm>
+            <a:off x="-63437" y="2976093"/>
+            <a:ext cx="395777" cy="276999"/>
+          </a:xfrm>
+          <a:prstGeom prst="rect">
+            <a:avLst/>
+          </a:prstGeom>
+          <a:noFill/>
+        </p:spPr>
+        <p:txBody>
+          <a:bodyPr wrap="square" rtlCol="0">
+            <a:spAutoFit/>
+          </a:bodyPr>
+          <a:lstStyle/>
+          <a:p>
+            <a:r>
+              <a:rPr lang="en-US" sz="1200" dirty="0">
+                <a:solidFill>
+                  <a:srgbClr val="FF0000"/>
+                </a:solidFill>
+              </a:rPr>
+              <a:t>(1)</a:t>
+            </a:r>
+          </a:p>
+        </p:txBody>
+      </p:sp>
+      <p:sp>
+        <p:nvSpPr>
+          <p:cNvPr id="7" name="Rounded Rectangle 6"/>
+          <p:cNvSpPr/>
+          <p:nvPr/>
+        </p:nvSpPr>
+        <p:spPr>
+          <a:xfrm>
+            <a:off x="233693" y="3673767"/>
+            <a:ext cx="1751052" cy="220720"/>
+          </a:xfrm>
+          <a:prstGeom prst="roundRect">
+            <a:avLst/>
+          </a:prstGeom>
+          <a:noFill/>
+          <a:ln>
+            <a:solidFill>
+              <a:srgbClr val="FF0000"/>
+            </a:solidFill>
+          </a:ln>
+        </p:spPr>
+        <p:style>
+          <a:lnRef idx="1">
+            <a:schemeClr val="accent1"/>
+          </a:lnRef>
+          <a:fillRef idx="3">
+            <a:schemeClr val="accent1"/>
+          </a:fillRef>
+          <a:effectRef idx="2">
+            <a:schemeClr val="accent1"/>
+          </a:effectRef>
+          <a:fontRef idx="minor">
+            <a:schemeClr val="lt1"/>
+          </a:fontRef>
+        </p:style>
+        <p:txBody>
+          <a:bodyPr rtlCol="0" anchor="ctr"/>
+          <a:lstStyle/>
+          <a:p>
+            <a:pPr algn="ctr"/>
+            <a:endParaRPr lang="en-US"/>
+          </a:p>
+        </p:txBody>
+      </p:sp>
+      <p:sp>
+        <p:nvSpPr>
+          <p:cNvPr id="8" name="TextBox 7"/>
+          <p:cNvSpPr txBox="1"/>
+          <p:nvPr/>
+        </p:nvSpPr>
+        <p:spPr>
+          <a:xfrm>
+            <a:off x="-63437" y="3625085"/>
+            <a:ext cx="395777" cy="276999"/>
+          </a:xfrm>
+          <a:prstGeom prst="rect">
+            <a:avLst/>
+          </a:prstGeom>
+          <a:noFill/>
+        </p:spPr>
+        <p:txBody>
+          <a:bodyPr wrap="square" rtlCol="0">
+            <a:spAutoFit/>
+          </a:bodyPr>
+          <a:lstStyle/>
+          <a:p>
+            <a:r>
+              <a:rPr lang="en-US" sz="1200">
+                <a:solidFill>
+                  <a:srgbClr val="FF0000"/>
+                </a:solidFill>
+              </a:rPr>
+              <a:t>(3)</a:t>
+            </a:r>
+            <a:endParaRPr lang="en-US" sz="1200" dirty="0">
+              <a:solidFill>
+                <a:srgbClr val="FF0000"/>
+              </a:solidFill>
+            </a:endParaRPr>
+          </a:p>
+        </p:txBody>
+      </p:sp>
+    </p:spTree>
+    <p:extLst>
+      <p:ext uri="{BB962C8B-B14F-4D97-AF65-F5344CB8AC3E}">
+        <p14:creationId xmlns:p14="http://schemas.microsoft.com/office/powerpoint/2010/main" val="3009936701"/>
+      </p:ext>
+    </p:extLst>
+  </p:cSld>
+  <p:clrMapOvr>
+    <a:masterClrMapping/>
+  </p:clrMapOvr>
+</p:sld>
+</file>
+
+<file path=ppt/slides/slide4.xml><?xml version="1.0" encoding="utf-8"?>
 <p:sld xmlns:a="http://schemas.openxmlformats.org/drawingml/2006/main" xmlns:r="http://schemas.openxmlformats.org/officeDocument/2006/relationships" xmlns:p="http://schemas.openxmlformats.org/presentationml/2006/main">
   <p:cSld>
     <p:spTree>
@@ -4224,7 +4478,7 @@
 </p:sld>
 </file>
 
-<file path=ppt/slides/slide4.xml><?xml version="1.0" encoding="utf-8"?>
+<file path=ppt/slides/slide5.xml><?xml version="1.0" encoding="utf-8"?>
 <p:sld xmlns:a="http://schemas.openxmlformats.org/drawingml/2006/main" xmlns:r="http://schemas.openxmlformats.org/officeDocument/2006/relationships" xmlns:p="http://schemas.openxmlformats.org/presentationml/2006/main">
   <p:cSld>
     <p:spTree>
@@ -4338,18 +4592,13 @@
           <a:lstStyle/>
           <a:p>
             <a:r>
-              <a:rPr lang="en-US" sz="1200" dirty="0" smtClean="0">
+              <a:rPr lang="en-US" sz="1200" dirty="0">
                 <a:solidFill>
                   <a:srgbClr val="FF0000"/>
                 </a:solidFill>
               </a:rPr>
               <a:t>(1)</a:t>
             </a:r>
-            <a:endParaRPr lang="en-US" sz="1200" dirty="0">
-              <a:solidFill>
-                <a:srgbClr val="FF0000"/>
-              </a:solidFill>
-            </a:endParaRPr>
           </a:p>
         </p:txBody>
       </p:sp>
@@ -4420,7 +4669,7 @@
           <a:lstStyle/>
           <a:p>
             <a:r>
-              <a:rPr lang="en-US" sz="1200" smtClean="0">
+              <a:rPr lang="en-US" sz="1200">
                 <a:solidFill>
                   <a:srgbClr val="FF0000"/>
                 </a:solidFill>
@@ -4448,7 +4697,7 @@
 </p:sld>
 </file>
 
-<file path=ppt/slides/slide5.xml><?xml version="1.0" encoding="utf-8"?>
+<file path=ppt/slides/slide6.xml><?xml version="1.0" encoding="utf-8"?>
 <p:sld xmlns:a="http://schemas.openxmlformats.org/drawingml/2006/main" xmlns:r="http://schemas.openxmlformats.org/officeDocument/2006/relationships" xmlns:p="http://schemas.openxmlformats.org/presentationml/2006/main">
   <p:cSld>
     <p:spTree>

</xml_diff>